<commit_message>
add pred graphs and results
</commit_message>
<xml_diff>
--- a/results and todos/ResultsFof2.pptx
+++ b/results and todos/ResultsFof2.pptx
@@ -5,9 +5,8 @@
     <p:sldMasterId id="2147483648" r:id="rId1"/>
   </p:sldMasterIdLst>
   <p:sldIdLst>
-    <p:sldId id="256" r:id="rId2"/>
+    <p:sldId id="258" r:id="rId2"/>
     <p:sldId id="257" r:id="rId3"/>
-    <p:sldId id="258" r:id="rId4"/>
   </p:sldIdLst>
   <p:sldSz cx="12192000" cy="6858000"/>
   <p:notesSz cx="6858000" cy="9144000"/>
@@ -106,6 +105,11 @@
       </a:defRPr>
     </a:lvl9pPr>
   </p:defaultTextStyle>
+  <p:extLst>
+    <p:ext uri="{EFAFB233-063F-42B5-8137-9DF3F51BA10A}">
+      <p15:sldGuideLst xmlns:p15="http://schemas.microsoft.com/office/powerpoint/2012/main"/>
+    </p:ext>
+  </p:extLst>
 </p:presentation>
 </file>
 
@@ -258,7 +262,7 @@
           <a:p>
             <a:fld id="{01D2DB5C-2116-4A9C-B9E1-81544DBEFC21}" type="datetimeFigureOut">
               <a:rPr lang="en-GB" smtClean="0"/>
-              <a:t>25/07/2023</a:t>
+              <a:t>02/08/2023</a:t>
             </a:fld>
             <a:endParaRPr lang="en-GB"/>
           </a:p>
@@ -458,7 +462,7 @@
           <a:p>
             <a:fld id="{01D2DB5C-2116-4A9C-B9E1-81544DBEFC21}" type="datetimeFigureOut">
               <a:rPr lang="en-GB" smtClean="0"/>
-              <a:t>25/07/2023</a:t>
+              <a:t>02/08/2023</a:t>
             </a:fld>
             <a:endParaRPr lang="en-GB"/>
           </a:p>
@@ -668,7 +672,7 @@
           <a:p>
             <a:fld id="{01D2DB5C-2116-4A9C-B9E1-81544DBEFC21}" type="datetimeFigureOut">
               <a:rPr lang="en-GB" smtClean="0"/>
-              <a:t>25/07/2023</a:t>
+              <a:t>02/08/2023</a:t>
             </a:fld>
             <a:endParaRPr lang="en-GB"/>
           </a:p>
@@ -868,7 +872,7 @@
           <a:p>
             <a:fld id="{01D2DB5C-2116-4A9C-B9E1-81544DBEFC21}" type="datetimeFigureOut">
               <a:rPr lang="en-GB" smtClean="0"/>
-              <a:t>25/07/2023</a:t>
+              <a:t>02/08/2023</a:t>
             </a:fld>
             <a:endParaRPr lang="en-GB"/>
           </a:p>
@@ -1144,7 +1148,7 @@
           <a:p>
             <a:fld id="{01D2DB5C-2116-4A9C-B9E1-81544DBEFC21}" type="datetimeFigureOut">
               <a:rPr lang="en-GB" smtClean="0"/>
-              <a:t>25/07/2023</a:t>
+              <a:t>02/08/2023</a:t>
             </a:fld>
             <a:endParaRPr lang="en-GB"/>
           </a:p>
@@ -1412,7 +1416,7 @@
           <a:p>
             <a:fld id="{01D2DB5C-2116-4A9C-B9E1-81544DBEFC21}" type="datetimeFigureOut">
               <a:rPr lang="en-GB" smtClean="0"/>
-              <a:t>25/07/2023</a:t>
+              <a:t>02/08/2023</a:t>
             </a:fld>
             <a:endParaRPr lang="en-GB"/>
           </a:p>
@@ -1827,7 +1831,7 @@
           <a:p>
             <a:fld id="{01D2DB5C-2116-4A9C-B9E1-81544DBEFC21}" type="datetimeFigureOut">
               <a:rPr lang="en-GB" smtClean="0"/>
-              <a:t>25/07/2023</a:t>
+              <a:t>02/08/2023</a:t>
             </a:fld>
             <a:endParaRPr lang="en-GB"/>
           </a:p>
@@ -1969,7 +1973,7 @@
           <a:p>
             <a:fld id="{01D2DB5C-2116-4A9C-B9E1-81544DBEFC21}" type="datetimeFigureOut">
               <a:rPr lang="en-GB" smtClean="0"/>
-              <a:t>25/07/2023</a:t>
+              <a:t>02/08/2023</a:t>
             </a:fld>
             <a:endParaRPr lang="en-GB"/>
           </a:p>
@@ -2082,7 +2086,7 @@
           <a:p>
             <a:fld id="{01D2DB5C-2116-4A9C-B9E1-81544DBEFC21}" type="datetimeFigureOut">
               <a:rPr lang="en-GB" smtClean="0"/>
-              <a:t>25/07/2023</a:t>
+              <a:t>02/08/2023</a:t>
             </a:fld>
             <a:endParaRPr lang="en-GB"/>
           </a:p>
@@ -2395,7 +2399,7 @@
           <a:p>
             <a:fld id="{01D2DB5C-2116-4A9C-B9E1-81544DBEFC21}" type="datetimeFigureOut">
               <a:rPr lang="en-GB" smtClean="0"/>
-              <a:t>25/07/2023</a:t>
+              <a:t>02/08/2023</a:t>
             </a:fld>
             <a:endParaRPr lang="en-GB"/>
           </a:p>
@@ -2684,7 +2688,7 @@
           <a:p>
             <a:fld id="{01D2DB5C-2116-4A9C-B9E1-81544DBEFC21}" type="datetimeFigureOut">
               <a:rPr lang="en-GB" smtClean="0"/>
-              <a:t>25/07/2023</a:t>
+              <a:t>02/08/2023</a:t>
             </a:fld>
             <a:endParaRPr lang="en-GB"/>
           </a:p>
@@ -2927,7 +2931,7 @@
           <a:p>
             <a:fld id="{01D2DB5C-2116-4A9C-B9E1-81544DBEFC21}" type="datetimeFigureOut">
               <a:rPr lang="en-GB" smtClean="0"/>
-              <a:t>25/07/2023</a:t>
+              <a:t>02/08/2023</a:t>
             </a:fld>
             <a:endParaRPr lang="en-GB"/>
           </a:p>
@@ -3346,31 +3350,57 @@
       </p:grpSpPr>
       <p:sp>
         <p:nvSpPr>
-          <p:cNvPr id="2" name="Title 1">
-            <a:extLst>
-              <a:ext uri="{FF2B5EF4-FFF2-40B4-BE49-F238E27FC236}">
-                <a16:creationId xmlns:a16="http://schemas.microsoft.com/office/drawing/2014/main" id="{40E13D3A-9220-015D-A8FF-FDF6109C46A5}"/>
-              </a:ext>
-            </a:extLst>
-          </p:cNvPr>
-          <p:cNvSpPr>
-            <a:spLocks noGrp="1"/>
-          </p:cNvSpPr>
-          <p:nvPr>
-            <p:ph type="ctrTitle"/>
-          </p:nvPr>
+          <p:cNvPr id="4" name="Title 1">
+            <a:extLst>
+              <a:ext uri="{FF2B5EF4-FFF2-40B4-BE49-F238E27FC236}">
+                <a16:creationId xmlns:a16="http://schemas.microsoft.com/office/drawing/2014/main" id="{E1B24FF4-30A9-5643-84B6-CEABF8961DE1}"/>
+              </a:ext>
+            </a:extLst>
+          </p:cNvPr>
+          <p:cNvSpPr txBox="1">
+            <a:spLocks/>
+          </p:cNvSpPr>
+          <p:nvPr/>
         </p:nvSpPr>
         <p:spPr>
           <a:xfrm>
-            <a:off x="4347882" y="215154"/>
-            <a:ext cx="2132613" cy="527272"/>
+            <a:off x="5153226" y="246187"/>
+            <a:ext cx="1088184" cy="527272"/>
           </a:xfrm>
+          <a:prstGeom prst="rect">
+            <a:avLst/>
+          </a:prstGeom>
         </p:spPr>
         <p:txBody>
-          <a:bodyPr>
+          <a:bodyPr vert="horz" lIns="91440" tIns="45720" rIns="91440" bIns="45720" rtlCol="0" anchor="ctr">
             <a:noAutofit/>
           </a:bodyPr>
-          <a:lstStyle/>
+          <a:lstStyle>
+            <a:lvl1pPr algn="l" defTabSz="914400" rtl="0" eaLnBrk="1" latinLnBrk="0" hangingPunct="1">
+              <a:lnSpc>
+                <a:spcPct val="90000"/>
+              </a:lnSpc>
+              <a:spcBef>
+                <a:spcPct val="0"/>
+              </a:spcBef>
+              <a:buNone/>
+              <a:defRPr sz="4400" kern="1200">
+                <a:solidFill>
+                  <a:schemeClr val="tx1"/>
+                </a:solidFill>
+                <a:latin typeface="+mj-lt"/>
+                <a:ea typeface="+mj-ea"/>
+                <a:cs typeface="+mj-cs"/>
+              </a:defRPr>
+            </a:lvl1pPr>
+          </a:lstStyle>
+          <a:p>
+            <a:endParaRPr lang="en-GB" sz="3200" dirty="0">
+              <a:solidFill>
+                <a:srgbClr val="00B0F0"/>
+              </a:solidFill>
+            </a:endParaRPr>
+          </a:p>
           <a:p>
             <a:r>
               <a:rPr lang="en-GB" sz="3200" dirty="0">
@@ -3378,17 +3408,24 @@
                   <a:srgbClr val="00B0F0"/>
                 </a:solidFill>
               </a:rPr>
-              <a:t>WUHN</a:t>
-            </a:r>
+              <a:t>ISTA</a:t>
+            </a:r>
+          </a:p>
+          <a:p>
+            <a:endParaRPr lang="en-GB" sz="3200" dirty="0">
+              <a:solidFill>
+                <a:srgbClr val="00B0F0"/>
+              </a:solidFill>
+            </a:endParaRPr>
           </a:p>
         </p:txBody>
       </p:sp>
       <p:pic>
         <p:nvPicPr>
-          <p:cNvPr id="5" name="Picture 4">
-            <a:extLst>
-              <a:ext uri="{FF2B5EF4-FFF2-40B4-BE49-F238E27FC236}">
-                <a16:creationId xmlns:a16="http://schemas.microsoft.com/office/drawing/2014/main" id="{7CA10ADA-C9BF-5263-8527-CA63E27FF33F}"/>
+          <p:cNvPr id="3" name="Picture 2">
+            <a:extLst>
+              <a:ext uri="{FF2B5EF4-FFF2-40B4-BE49-F238E27FC236}">
+                <a16:creationId xmlns:a16="http://schemas.microsoft.com/office/drawing/2014/main" id="{B862E6D5-8506-7DC4-E2A8-E57C2C7A7985}"/>
               </a:ext>
             </a:extLst>
           </p:cNvPr>
@@ -3411,8 +3448,8 @@
         </p:blipFill>
         <p:spPr>
           <a:xfrm>
-            <a:off x="213460" y="697959"/>
-            <a:ext cx="4096520" cy="2697485"/>
+            <a:off x="1177407" y="729686"/>
+            <a:ext cx="3975819" cy="2699314"/>
           </a:xfrm>
           <a:prstGeom prst="rect">
             <a:avLst/>
@@ -3421,10 +3458,10 @@
       </p:pic>
       <p:pic>
         <p:nvPicPr>
-          <p:cNvPr id="7" name="Picture 6">
-            <a:extLst>
-              <a:ext uri="{FF2B5EF4-FFF2-40B4-BE49-F238E27FC236}">
-                <a16:creationId xmlns:a16="http://schemas.microsoft.com/office/drawing/2014/main" id="{60EAEC00-B5AF-3564-01DB-71AA4DDCE881}"/>
+          <p:cNvPr id="6" name="Picture 5">
+            <a:extLst>
+              <a:ext uri="{FF2B5EF4-FFF2-40B4-BE49-F238E27FC236}">
+                <a16:creationId xmlns:a16="http://schemas.microsoft.com/office/drawing/2014/main" id="{B2DA4632-8597-905E-CECF-8FC83D5A6FA1}"/>
               </a:ext>
             </a:extLst>
           </p:cNvPr>
@@ -3447,8 +3484,8 @@
         </p:blipFill>
         <p:spPr>
           <a:xfrm>
-            <a:off x="5656412" y="697959"/>
-            <a:ext cx="3968504" cy="2697485"/>
+            <a:off x="1177407" y="3740363"/>
+            <a:ext cx="3975819" cy="2699314"/>
           </a:xfrm>
           <a:prstGeom prst="rect">
             <a:avLst/>
@@ -3457,10 +3494,10 @@
       </p:pic>
       <p:pic>
         <p:nvPicPr>
-          <p:cNvPr id="9" name="Picture 8">
-            <a:extLst>
-              <a:ext uri="{FF2B5EF4-FFF2-40B4-BE49-F238E27FC236}">
-                <a16:creationId xmlns:a16="http://schemas.microsoft.com/office/drawing/2014/main" id="{0080E60F-27D6-9C4D-B984-F83EC7223FFC}"/>
+          <p:cNvPr id="8" name="Picture 7">
+            <a:extLst>
+              <a:ext uri="{FF2B5EF4-FFF2-40B4-BE49-F238E27FC236}">
+                <a16:creationId xmlns:a16="http://schemas.microsoft.com/office/drawing/2014/main" id="{C6FEA022-B9EB-1755-63EE-A8CF8F8F5C2D}"/>
               </a:ext>
             </a:extLst>
           </p:cNvPr>
@@ -3483,8 +3520,8 @@
         </p:blipFill>
         <p:spPr>
           <a:xfrm>
-            <a:off x="306829" y="3429000"/>
-            <a:ext cx="3968504" cy="2697485"/>
+            <a:off x="6440229" y="773459"/>
+            <a:ext cx="3975819" cy="2699314"/>
           </a:xfrm>
           <a:prstGeom prst="rect">
             <a:avLst/>
@@ -3496,7 +3533,7 @@
           <p:cNvPr id="11" name="Picture 10">
             <a:extLst>
               <a:ext uri="{FF2B5EF4-FFF2-40B4-BE49-F238E27FC236}">
-                <a16:creationId xmlns:a16="http://schemas.microsoft.com/office/drawing/2014/main" id="{C269DAFA-AD13-C0D6-CD86-AB2A8EB41CC3}"/>
+                <a16:creationId xmlns:a16="http://schemas.microsoft.com/office/drawing/2014/main" id="{B7CCA712-0955-2611-BA96-A8B3342DD643}"/>
               </a:ext>
             </a:extLst>
           </p:cNvPr>
@@ -3519,8 +3556,8 @@
         </p:blipFill>
         <p:spPr>
           <a:xfrm>
-            <a:off x="5592404" y="3515198"/>
-            <a:ext cx="4096520" cy="2697485"/>
+            <a:off x="6524120" y="3740363"/>
+            <a:ext cx="3975819" cy="2699314"/>
           </a:xfrm>
           <a:prstGeom prst="rect">
             <a:avLst/>
@@ -3530,7 +3567,7 @@
     </p:spTree>
     <p:extLst>
       <p:ext uri="{BB962C8B-B14F-4D97-AF65-F5344CB8AC3E}">
-        <p14:creationId xmlns:p14="http://schemas.microsoft.com/office/powerpoint/2010/main" val="421860979"/>
+        <p14:creationId xmlns:p14="http://schemas.microsoft.com/office/powerpoint/2010/main" val="375624376"/>
       </p:ext>
     </p:extLst>
   </p:cSld>
@@ -3617,10 +3654,10 @@
       </p:sp>
       <p:pic>
         <p:nvPicPr>
-          <p:cNvPr id="10" name="Picture 9">
-            <a:extLst>
-              <a:ext uri="{FF2B5EF4-FFF2-40B4-BE49-F238E27FC236}">
-                <a16:creationId xmlns:a16="http://schemas.microsoft.com/office/drawing/2014/main" id="{4D9AD42D-9C36-5E6C-637D-C4C30D4D437A}"/>
+          <p:cNvPr id="5" name="Picture 4">
+            <a:extLst>
+              <a:ext uri="{FF2B5EF4-FFF2-40B4-BE49-F238E27FC236}">
+                <a16:creationId xmlns:a16="http://schemas.microsoft.com/office/drawing/2014/main" id="{F8FA7543-DA2D-4579-7E50-C82C39CD2BDA}"/>
               </a:ext>
             </a:extLst>
           </p:cNvPr>
@@ -3643,8 +3680,8 @@
         </p:blipFill>
         <p:spPr>
           <a:xfrm>
-            <a:off x="1276269" y="3569303"/>
-            <a:ext cx="3968504" cy="2697485"/>
+            <a:off x="1249729" y="826548"/>
+            <a:ext cx="3975819" cy="2699314"/>
           </a:xfrm>
           <a:prstGeom prst="rect">
             <a:avLst/>
@@ -3653,10 +3690,10 @@
       </p:pic>
       <p:pic>
         <p:nvPicPr>
-          <p:cNvPr id="12" name="Picture 11">
-            <a:extLst>
-              <a:ext uri="{FF2B5EF4-FFF2-40B4-BE49-F238E27FC236}">
-                <a16:creationId xmlns:a16="http://schemas.microsoft.com/office/drawing/2014/main" id="{E4D4F14E-8A01-BE89-7805-FA385F284075}"/>
+          <p:cNvPr id="8" name="Picture 7">
+            <a:extLst>
+              <a:ext uri="{FF2B5EF4-FFF2-40B4-BE49-F238E27FC236}">
+                <a16:creationId xmlns:a16="http://schemas.microsoft.com/office/drawing/2014/main" id="{5FCE0A2C-44DB-DD36-DBE6-81B1830500FC}"/>
               </a:ext>
             </a:extLst>
           </p:cNvPr>
@@ -3679,8 +3716,8 @@
         </p:blipFill>
         <p:spPr>
           <a:xfrm>
-            <a:off x="5877631" y="731514"/>
-            <a:ext cx="3968504" cy="2697485"/>
+            <a:off x="1249729" y="3634526"/>
+            <a:ext cx="3975819" cy="2699314"/>
           </a:xfrm>
           <a:prstGeom prst="rect">
             <a:avLst/>
@@ -3689,10 +3726,10 @@
       </p:pic>
       <p:pic>
         <p:nvPicPr>
-          <p:cNvPr id="14" name="Picture 13">
-            <a:extLst>
-              <a:ext uri="{FF2B5EF4-FFF2-40B4-BE49-F238E27FC236}">
-                <a16:creationId xmlns:a16="http://schemas.microsoft.com/office/drawing/2014/main" id="{77C82274-2CB8-69B2-C9D6-D294AF018762}"/>
+          <p:cNvPr id="10" name="Picture 9">
+            <a:extLst>
+              <a:ext uri="{FF2B5EF4-FFF2-40B4-BE49-F238E27FC236}">
+                <a16:creationId xmlns:a16="http://schemas.microsoft.com/office/drawing/2014/main" id="{04CABDD9-9282-3A99-8222-E39A3945B430}"/>
               </a:ext>
             </a:extLst>
           </p:cNvPr>
@@ -3715,8 +3752,8 @@
         </p:blipFill>
         <p:spPr>
           <a:xfrm>
-            <a:off x="5877631" y="3569303"/>
-            <a:ext cx="3968504" cy="2697485"/>
+            <a:off x="6096000" y="869989"/>
+            <a:ext cx="3975819" cy="2699314"/>
           </a:xfrm>
           <a:prstGeom prst="rect">
             <a:avLst/>
@@ -3725,10 +3762,10 @@
       </p:pic>
       <p:pic>
         <p:nvPicPr>
-          <p:cNvPr id="16" name="Picture 15">
-            <a:extLst>
-              <a:ext uri="{FF2B5EF4-FFF2-40B4-BE49-F238E27FC236}">
-                <a16:creationId xmlns:a16="http://schemas.microsoft.com/office/drawing/2014/main" id="{CDD8D7E4-16D8-A598-58A2-AAFA2C88A77D}"/>
+          <p:cNvPr id="13" name="Picture 12">
+            <a:extLst>
+              <a:ext uri="{FF2B5EF4-FFF2-40B4-BE49-F238E27FC236}">
+                <a16:creationId xmlns:a16="http://schemas.microsoft.com/office/drawing/2014/main" id="{7545E0AD-5EDF-44F6-9BF1-991E47C47F7B}"/>
               </a:ext>
             </a:extLst>
           </p:cNvPr>
@@ -3751,8 +3788,8 @@
         </p:blipFill>
         <p:spPr>
           <a:xfrm>
-            <a:off x="1276269" y="731515"/>
-            <a:ext cx="3968504" cy="2697485"/>
+            <a:off x="6297617" y="3707778"/>
+            <a:ext cx="3975819" cy="2699314"/>
           </a:xfrm>
           <a:prstGeom prst="rect">
             <a:avLst/>
@@ -3763,252 +3800,6 @@
     <p:extLst>
       <p:ext uri="{BB962C8B-B14F-4D97-AF65-F5344CB8AC3E}">
         <p14:creationId xmlns:p14="http://schemas.microsoft.com/office/powerpoint/2010/main" val="1661072184"/>
-      </p:ext>
-    </p:extLst>
-  </p:cSld>
-  <p:clrMapOvr>
-    <a:masterClrMapping/>
-  </p:clrMapOvr>
-</p:sld>
-</file>
-
-<file path=ppt/slides/slide3.xml><?xml version="1.0" encoding="utf-8"?>
-<p:sld xmlns:a="http://schemas.openxmlformats.org/drawingml/2006/main" xmlns:r="http://schemas.openxmlformats.org/officeDocument/2006/relationships" xmlns:p="http://schemas.openxmlformats.org/presentationml/2006/main">
-  <p:cSld>
-    <p:spTree>
-      <p:nvGrpSpPr>
-        <p:cNvPr id="1" name=""/>
-        <p:cNvGrpSpPr/>
-        <p:nvPr/>
-      </p:nvGrpSpPr>
-      <p:grpSpPr>
-        <a:xfrm>
-          <a:off x="0" y="0"/>
-          <a:ext cx="0" cy="0"/>
-          <a:chOff x="0" y="0"/>
-          <a:chExt cx="0" cy="0"/>
-        </a:xfrm>
-      </p:grpSpPr>
-      <p:sp>
-        <p:nvSpPr>
-          <p:cNvPr id="4" name="Title 1">
-            <a:extLst>
-              <a:ext uri="{FF2B5EF4-FFF2-40B4-BE49-F238E27FC236}">
-                <a16:creationId xmlns:a16="http://schemas.microsoft.com/office/drawing/2014/main" id="{E1B24FF4-30A9-5643-84B6-CEABF8961DE1}"/>
-              </a:ext>
-            </a:extLst>
-          </p:cNvPr>
-          <p:cNvSpPr txBox="1">
-            <a:spLocks/>
-          </p:cNvSpPr>
-          <p:nvPr/>
-        </p:nvSpPr>
-        <p:spPr>
-          <a:xfrm>
-            <a:off x="5153226" y="246187"/>
-            <a:ext cx="1088184" cy="527272"/>
-          </a:xfrm>
-          <a:prstGeom prst="rect">
-            <a:avLst/>
-          </a:prstGeom>
-        </p:spPr>
-        <p:txBody>
-          <a:bodyPr vert="horz" lIns="91440" tIns="45720" rIns="91440" bIns="45720" rtlCol="0" anchor="ctr">
-            <a:noAutofit/>
-          </a:bodyPr>
-          <a:lstStyle>
-            <a:lvl1pPr algn="l" defTabSz="914400" rtl="0" eaLnBrk="1" latinLnBrk="0" hangingPunct="1">
-              <a:lnSpc>
-                <a:spcPct val="90000"/>
-              </a:lnSpc>
-              <a:spcBef>
-                <a:spcPct val="0"/>
-              </a:spcBef>
-              <a:buNone/>
-              <a:defRPr sz="4400" kern="1200">
-                <a:solidFill>
-                  <a:schemeClr val="tx1"/>
-                </a:solidFill>
-                <a:latin typeface="+mj-lt"/>
-                <a:ea typeface="+mj-ea"/>
-                <a:cs typeface="+mj-cs"/>
-              </a:defRPr>
-            </a:lvl1pPr>
-          </a:lstStyle>
-          <a:p>
-            <a:endParaRPr lang="en-GB" sz="3200" dirty="0">
-              <a:solidFill>
-                <a:srgbClr val="00B0F0"/>
-              </a:solidFill>
-            </a:endParaRPr>
-          </a:p>
-          <a:p>
-            <a:r>
-              <a:rPr lang="en-GB" sz="3200" dirty="0">
-                <a:solidFill>
-                  <a:srgbClr val="00B0F0"/>
-                </a:solidFill>
-              </a:rPr>
-              <a:t>ISTA</a:t>
-            </a:r>
-          </a:p>
-          <a:p>
-            <a:endParaRPr lang="en-GB" sz="3200" dirty="0">
-              <a:solidFill>
-                <a:srgbClr val="00B0F0"/>
-              </a:solidFill>
-            </a:endParaRPr>
-          </a:p>
-        </p:txBody>
-      </p:sp>
-      <p:pic>
-        <p:nvPicPr>
-          <p:cNvPr id="10" name="Picture 9">
-            <a:extLst>
-              <a:ext uri="{FF2B5EF4-FFF2-40B4-BE49-F238E27FC236}">
-                <a16:creationId xmlns:a16="http://schemas.microsoft.com/office/drawing/2014/main" id="{E47801F9-1A3B-7D29-0B97-22CEDF3FB899}"/>
-              </a:ext>
-            </a:extLst>
-          </p:cNvPr>
-          <p:cNvPicPr>
-            <a:picLocks noChangeAspect="1"/>
-          </p:cNvPicPr>
-          <p:nvPr/>
-        </p:nvPicPr>
-        <p:blipFill>
-          <a:blip r:embed="rId2">
-            <a:extLst>
-              <a:ext uri="{28A0092B-C50C-407E-A947-70E740481C1C}">
-                <a14:useLocalDpi xmlns:a14="http://schemas.microsoft.com/office/drawing/2010/main" val="0"/>
-              </a:ext>
-            </a:extLst>
-          </a:blip>
-          <a:stretch>
-            <a:fillRect/>
-          </a:stretch>
-        </p:blipFill>
-        <p:spPr>
-          <a:xfrm>
-            <a:off x="5958468" y="670908"/>
-            <a:ext cx="3968504" cy="2697485"/>
-          </a:xfrm>
-          <a:prstGeom prst="rect">
-            <a:avLst/>
-          </a:prstGeom>
-        </p:spPr>
-      </p:pic>
-      <p:pic>
-        <p:nvPicPr>
-          <p:cNvPr id="12" name="Picture 11">
-            <a:extLst>
-              <a:ext uri="{FF2B5EF4-FFF2-40B4-BE49-F238E27FC236}">
-                <a16:creationId xmlns:a16="http://schemas.microsoft.com/office/drawing/2014/main" id="{617F7D80-7697-88EE-61A4-3C0325B2591D}"/>
-              </a:ext>
-            </a:extLst>
-          </p:cNvPr>
-          <p:cNvPicPr>
-            <a:picLocks noChangeAspect="1"/>
-          </p:cNvPicPr>
-          <p:nvPr/>
-        </p:nvPicPr>
-        <p:blipFill>
-          <a:blip r:embed="rId3">
-            <a:extLst>
-              <a:ext uri="{28A0092B-C50C-407E-A947-70E740481C1C}">
-                <a14:useLocalDpi xmlns:a14="http://schemas.microsoft.com/office/drawing/2010/main" val="0"/>
-              </a:ext>
-            </a:extLst>
-          </a:blip>
-          <a:stretch>
-            <a:fillRect/>
-          </a:stretch>
-        </p:blipFill>
-        <p:spPr>
-          <a:xfrm>
-            <a:off x="5958468" y="3531339"/>
-            <a:ext cx="3968504" cy="2697485"/>
-          </a:xfrm>
-          <a:prstGeom prst="rect">
-            <a:avLst/>
-          </a:prstGeom>
-        </p:spPr>
-      </p:pic>
-      <p:pic>
-        <p:nvPicPr>
-          <p:cNvPr id="14" name="Picture 13">
-            <a:extLst>
-              <a:ext uri="{FF2B5EF4-FFF2-40B4-BE49-F238E27FC236}">
-                <a16:creationId xmlns:a16="http://schemas.microsoft.com/office/drawing/2014/main" id="{2A586B25-FF14-2875-9410-9CB34CE21E8A}"/>
-              </a:ext>
-            </a:extLst>
-          </p:cNvPr>
-          <p:cNvPicPr>
-            <a:picLocks noChangeAspect="1"/>
-          </p:cNvPicPr>
-          <p:nvPr/>
-        </p:nvPicPr>
-        <p:blipFill>
-          <a:blip r:embed="rId4">
-            <a:extLst>
-              <a:ext uri="{28A0092B-C50C-407E-A947-70E740481C1C}">
-                <a14:useLocalDpi xmlns:a14="http://schemas.microsoft.com/office/drawing/2010/main" val="0"/>
-              </a:ext>
-            </a:extLst>
-          </a:blip>
-          <a:stretch>
-            <a:fillRect/>
-          </a:stretch>
-        </p:blipFill>
-        <p:spPr>
-          <a:xfrm>
-            <a:off x="1056706" y="731515"/>
-            <a:ext cx="4096520" cy="2697485"/>
-          </a:xfrm>
-          <a:prstGeom prst="rect">
-            <a:avLst/>
-          </a:prstGeom>
-        </p:spPr>
-      </p:pic>
-      <p:pic>
-        <p:nvPicPr>
-          <p:cNvPr id="16" name="Picture 15">
-            <a:extLst>
-              <a:ext uri="{FF2B5EF4-FFF2-40B4-BE49-F238E27FC236}">
-                <a16:creationId xmlns:a16="http://schemas.microsoft.com/office/drawing/2014/main" id="{EE451503-DFBA-ED3F-2A76-7D18D38CF88F}"/>
-              </a:ext>
-            </a:extLst>
-          </p:cNvPr>
-          <p:cNvPicPr>
-            <a:picLocks noChangeAspect="1"/>
-          </p:cNvPicPr>
-          <p:nvPr/>
-        </p:nvPicPr>
-        <p:blipFill>
-          <a:blip r:embed="rId5">
-            <a:extLst>
-              <a:ext uri="{28A0092B-C50C-407E-A947-70E740481C1C}">
-                <a14:useLocalDpi xmlns:a14="http://schemas.microsoft.com/office/drawing/2010/main" val="0"/>
-              </a:ext>
-            </a:extLst>
-          </a:blip>
-          <a:stretch>
-            <a:fillRect/>
-          </a:stretch>
-        </p:blipFill>
-        <p:spPr>
-          <a:xfrm>
-            <a:off x="1079128" y="3569090"/>
-            <a:ext cx="3968504" cy="2697485"/>
-          </a:xfrm>
-          <a:prstGeom prst="rect">
-            <a:avLst/>
-          </a:prstGeom>
-        </p:spPr>
-      </p:pic>
-    </p:spTree>
-    <p:extLst>
-      <p:ext uri="{BB962C8B-B14F-4D97-AF65-F5344CB8AC3E}">
-        <p14:creationId xmlns:p14="http://schemas.microsoft.com/office/powerpoint/2010/main" val="375624376"/>
       </p:ext>
     </p:extLst>
   </p:cSld>

</xml_diff>